<commit_message>
Updated 02 Open Project
</commit_message>
<xml_diff>
--- a/Lecture Slides/02 Open Project.pptx
+++ b/Lecture Slides/02 Open Project.pptx
@@ -23,11 +23,13 @@
     <p:sldId id="271" r:id="rId17"/>
     <p:sldId id="265" r:id="rId18"/>
     <p:sldId id="264" r:id="rId19"/>
-    <p:sldId id="262" r:id="rId20"/>
-    <p:sldId id="263" r:id="rId21"/>
-    <p:sldId id="272" r:id="rId22"/>
-    <p:sldId id="273" r:id="rId23"/>
-    <p:sldId id="280" r:id="rId24"/>
+    <p:sldId id="281" r:id="rId20"/>
+    <p:sldId id="262" r:id="rId21"/>
+    <p:sldId id="263" r:id="rId22"/>
+    <p:sldId id="272" r:id="rId23"/>
+    <p:sldId id="273" r:id="rId24"/>
+    <p:sldId id="282" r:id="rId25"/>
+    <p:sldId id="280" r:id="rId26"/>
   </p:sldIdLst>
   <p:sldSz cx="9144000" cy="6858000" type="screen4x3"/>
   <p:notesSz cx="7559675" cy="10691813"/>
@@ -263,7 +265,7 @@
           <a:p>
             <a:fld id="{5896A8B8-A7CB-914F-A9DE-93D0CA668D65}" type="datetimeFigureOut">
               <a:rPr lang="en-US" smtClean="0"/>
-              <a:t>9/25/2018</a:t>
+              <a:t>9/26/2018</a:t>
             </a:fld>
             <a:endParaRPr lang="en-US"/>
           </a:p>
@@ -426,7 +428,7 @@
           <a:p>
             <a:fld id="{5896A8B8-A7CB-914F-A9DE-93D0CA668D65}" type="datetimeFigureOut">
               <a:rPr lang="en-US" smtClean="0"/>
-              <a:t>9/25/2018</a:t>
+              <a:t>9/26/2018</a:t>
             </a:fld>
             <a:endParaRPr lang="en-US"/>
           </a:p>
@@ -599,7 +601,7 @@
           <a:p>
             <a:fld id="{5896A8B8-A7CB-914F-A9DE-93D0CA668D65}" type="datetimeFigureOut">
               <a:rPr lang="en-US" smtClean="0"/>
-              <a:t>9/25/2018</a:t>
+              <a:t>9/26/2018</a:t>
             </a:fld>
             <a:endParaRPr lang="en-US"/>
           </a:p>
@@ -810,7 +812,7 @@
           <a:p>
             <a:fld id="{5896A8B8-A7CB-914F-A9DE-93D0CA668D65}" type="datetimeFigureOut">
               <a:rPr lang="en-US" smtClean="0"/>
-              <a:t>9/25/2018</a:t>
+              <a:t>9/26/2018</a:t>
             </a:fld>
             <a:endParaRPr lang="en-US"/>
           </a:p>
@@ -1050,7 +1052,7 @@
           <a:p>
             <a:fld id="{5896A8B8-A7CB-914F-A9DE-93D0CA668D65}" type="datetimeFigureOut">
               <a:rPr lang="en-US" smtClean="0"/>
-              <a:t>9/25/2018</a:t>
+              <a:t>9/26/2018</a:t>
             </a:fld>
             <a:endParaRPr lang="en-US"/>
           </a:p>
@@ -1274,7 +1276,7 @@
           <a:p>
             <a:fld id="{5896A8B8-A7CB-914F-A9DE-93D0CA668D65}" type="datetimeFigureOut">
               <a:rPr lang="en-US" smtClean="0"/>
-              <a:t>9/25/2018</a:t>
+              <a:t>9/26/2018</a:t>
             </a:fld>
             <a:endParaRPr lang="en-US"/>
           </a:p>
@@ -1633,7 +1635,7 @@
           <a:p>
             <a:fld id="{5896A8B8-A7CB-914F-A9DE-93D0CA668D65}" type="datetimeFigureOut">
               <a:rPr lang="en-US" smtClean="0"/>
-              <a:t>9/25/2018</a:t>
+              <a:t>9/26/2018</a:t>
             </a:fld>
             <a:endParaRPr lang="en-US"/>
           </a:p>
@@ -1745,7 +1747,7 @@
           <a:p>
             <a:fld id="{5896A8B8-A7CB-914F-A9DE-93D0CA668D65}" type="datetimeFigureOut">
               <a:rPr lang="en-US" smtClean="0"/>
-              <a:t>9/25/2018</a:t>
+              <a:t>9/26/2018</a:t>
             </a:fld>
             <a:endParaRPr lang="en-US"/>
           </a:p>
@@ -1835,7 +1837,7 @@
           <a:p>
             <a:fld id="{5896A8B8-A7CB-914F-A9DE-93D0CA668D65}" type="datetimeFigureOut">
               <a:rPr lang="en-US" smtClean="0"/>
-              <a:t>9/25/2018</a:t>
+              <a:t>9/26/2018</a:t>
             </a:fld>
             <a:endParaRPr lang="en-US"/>
           </a:p>
@@ -2105,7 +2107,7 @@
           <a:p>
             <a:fld id="{5896A8B8-A7CB-914F-A9DE-93D0CA668D65}" type="datetimeFigureOut">
               <a:rPr lang="en-US" smtClean="0"/>
-              <a:t>9/25/2018</a:t>
+              <a:t>9/26/2018</a:t>
             </a:fld>
             <a:endParaRPr lang="en-US"/>
           </a:p>
@@ -2352,7 +2354,7 @@
           <a:p>
             <a:fld id="{5896A8B8-A7CB-914F-A9DE-93D0CA668D65}" type="datetimeFigureOut">
               <a:rPr lang="en-US" smtClean="0"/>
-              <a:t>9/25/2018</a:t>
+              <a:t>9/26/2018</a:t>
             </a:fld>
             <a:endParaRPr lang="en-US"/>
           </a:p>
@@ -2560,7 +2562,7 @@
             <a:fld id="{5896A8B8-A7CB-914F-A9DE-93D0CA668D65}" type="datetimeFigureOut">
               <a:rPr lang="en-US" smtClean="0"/>
               <a:pPr/>
-              <a:t>9/25/2018</a:t>
+              <a:t>9/26/2018</a:t>
             </a:fld>
             <a:endParaRPr lang="en-US"/>
           </a:p>
@@ -3308,14 +3310,14 @@
             <a:pPr lvl="0"/>
             <a:r>
               <a:rPr lang="en-GB" dirty="0"/>
-              <a:t>Agenda – A very brief overview of what the meeting should be about</a:t>
+              <a:t>Agenda – A very brief overview of what the meeting is intended to be about</a:t>
             </a:r>
           </a:p>
           <a:p>
             <a:pPr lvl="0"/>
             <a:r>
               <a:rPr lang="en-GB" dirty="0"/>
-              <a:t>Minutes – Any major decisions or actions arising from the meeting</a:t>
+              <a:t>Minutes – Any major decisions or actions arising from the meeting (a bullet-point list is fine !)</a:t>
             </a:r>
           </a:p>
         </p:txBody>
@@ -3811,7 +3813,7 @@
           <a:p>
             <a:r>
               <a:rPr lang="en-GB" dirty="0"/>
-              <a:t>Don’t expect you to predict everything at the start</a:t>
+              <a:t>We don’t expect you to predict it all in week 1</a:t>
             </a:r>
           </a:p>
           <a:p>
@@ -3824,6 +3826,12 @@
             <a:r>
               <a:rPr lang="en-GB" dirty="0"/>
               <a:t>Whole team should agree on significant changes</a:t>
+            </a:r>
+          </a:p>
+          <a:p>
+            <a:r>
+              <a:rPr lang="en-GB" dirty="0"/>
+              <a:t>Don’t just go in and hike up your effort hours !</a:t>
             </a:r>
           </a:p>
         </p:txBody>
@@ -4033,7 +4041,7 @@
           <a:p>
             <a:r>
               <a:rPr lang="en-GB" dirty="0"/>
-              <a:t>No need to use all work package types</a:t>
+              <a:t>Don’t feel you need to use all work package types</a:t>
             </a:r>
           </a:p>
           <a:p>
@@ -4076,10 +4084,10 @@
       </p:grpSpPr>
       <p:sp>
         <p:nvSpPr>
-          <p:cNvPr id="2" name="Title 1">
+          <p:cNvPr id="4" name="Title 3">
             <a:extLst>
               <a:ext uri="{FF2B5EF4-FFF2-40B4-BE49-F238E27FC236}">
-                <a16:creationId xmlns:a16="http://schemas.microsoft.com/office/drawing/2014/main" id="{28B4DDE3-84C6-4C3B-9755-3D6487B2A7E4}"/>
+                <a16:creationId xmlns:a16="http://schemas.microsoft.com/office/drawing/2014/main" id="{7CDE2FF9-0E7A-43DC-A61F-BB8863025C54}"/>
               </a:ext>
             </a:extLst>
           </p:cNvPr>
@@ -4095,90 +4103,22 @@
           <a:bodyPr/>
           <a:lstStyle/>
           <a:p>
-            <a:r>
-              <a:rPr lang="en-GB" dirty="0"/>
-              <a:t>Monitoring</a:t>
-            </a:r>
-          </a:p>
-        </p:txBody>
-      </p:sp>
-      <p:sp>
-        <p:nvSpPr>
-          <p:cNvPr id="3" name="Content Placeholder 2">
-            <a:extLst>
-              <a:ext uri="{FF2B5EF4-FFF2-40B4-BE49-F238E27FC236}">
-                <a16:creationId xmlns:a16="http://schemas.microsoft.com/office/drawing/2014/main" id="{4588F19C-498A-4DB4-98A7-F96A3EA73515}"/>
-              </a:ext>
-            </a:extLst>
-          </p:cNvPr>
-          <p:cNvSpPr>
-            <a:spLocks noGrp="1"/>
-          </p:cNvSpPr>
-          <p:nvPr>
-            <p:ph idx="1"/>
-          </p:nvPr>
-        </p:nvSpPr>
-        <p:spPr/>
-        <p:txBody>
-          <a:bodyPr/>
-          <a:lstStyle/>
-          <a:p>
-            <a:r>
-              <a:rPr lang="en-GB" dirty="0"/>
-              <a:t>OP provides us with project transparency</a:t>
-            </a:r>
-          </a:p>
-          <a:p>
-            <a:r>
-              <a:rPr lang="en-GB" dirty="0"/>
-              <a:t>We’ll be able to see what you are up to !</a:t>
-            </a:r>
-          </a:p>
-          <a:p>
-            <a:r>
-              <a:rPr lang="en-GB" dirty="0"/>
-              <a:t>This has a number of “benefits”…</a:t>
-            </a:r>
-          </a:p>
-          <a:p>
+            <a:pPr algn="ctr"/>
+            <a:r>
+              <a:rPr lang="en-GB" dirty="0"/>
+              <a:t>The BIG payoff ?</a:t>
+            </a:r>
+            <a:br>
+              <a:rPr lang="en-GB" dirty="0"/>
+            </a:br>
             <a:endParaRPr lang="en-GB" dirty="0"/>
-          </a:p>
-          <a:p>
-            <a:r>
-              <a:rPr lang="en-GB" dirty="0"/>
-              <a:t>We can monitor the patterns and flow of work</a:t>
-            </a:r>
-          </a:p>
-          <a:p>
-            <a:r>
-              <a:rPr lang="en-GB" dirty="0"/>
-              <a:t>We can spot problems early on</a:t>
-            </a:r>
-          </a:p>
-          <a:p>
-            <a:r>
-              <a:rPr lang="en-GB" dirty="0"/>
-              <a:t>We can “encourage” when work is falling behind</a:t>
-            </a:r>
-          </a:p>
-          <a:p>
-            <a:r>
-              <a:rPr lang="en-GB" dirty="0"/>
-              <a:t>We can tell if people aren’t pulling their weight</a:t>
-            </a:r>
-          </a:p>
-          <a:p>
-            <a:r>
-              <a:rPr lang="en-GB" dirty="0"/>
-              <a:t>We can mark teams on process, as well as product</a:t>
-            </a:r>
           </a:p>
         </p:txBody>
       </p:sp>
     </p:spTree>
     <p:extLst>
       <p:ext uri="{BB962C8B-B14F-4D97-AF65-F5344CB8AC3E}">
-        <p14:creationId xmlns:p14="http://schemas.microsoft.com/office/powerpoint/2010/main" val="1574101972"/>
+        <p14:creationId xmlns:p14="http://schemas.microsoft.com/office/powerpoint/2010/main" val="2568298180"/>
       </p:ext>
     </p:extLst>
   </p:cSld>
@@ -4274,6 +4214,12 @@
           </a:p>
           <a:p>
             <a:endParaRPr lang="en-GB" dirty="0"/>
+          </a:p>
+          <a:p>
+            <a:r>
+              <a:rPr lang="en-GB" dirty="0"/>
+              <a:t>We have it installed on our development server</a:t>
+            </a:r>
           </a:p>
           <a:p>
             <a:r>
@@ -4324,7 +4270,7 @@
           <p:cNvPr id="2" name="Title 1">
             <a:extLst>
               <a:ext uri="{FF2B5EF4-FFF2-40B4-BE49-F238E27FC236}">
-                <a16:creationId xmlns:a16="http://schemas.microsoft.com/office/drawing/2014/main" id="{F35733BB-C782-4634-A539-8D44F26FC7A3}"/>
+                <a16:creationId xmlns:a16="http://schemas.microsoft.com/office/drawing/2014/main" id="{28B4DDE3-84C6-4C3B-9755-3D6487B2A7E4}"/>
               </a:ext>
             </a:extLst>
           </p:cNvPr>
@@ -4342,7 +4288,7 @@
           <a:p>
             <a:r>
               <a:rPr lang="en-GB" dirty="0"/>
-              <a:t>Specific things we will be looking for</a:t>
+              <a:t>Monitoring</a:t>
             </a:r>
           </a:p>
         </p:txBody>
@@ -4352,7 +4298,7 @@
           <p:cNvPr id="3" name="Content Placeholder 2">
             <a:extLst>
               <a:ext uri="{FF2B5EF4-FFF2-40B4-BE49-F238E27FC236}">
-                <a16:creationId xmlns:a16="http://schemas.microsoft.com/office/drawing/2014/main" id="{9E1EE52C-534F-4676-84E9-980717139303}"/>
+                <a16:creationId xmlns:a16="http://schemas.microsoft.com/office/drawing/2014/main" id="{4588F19C-498A-4DB4-98A7-F96A3EA73515}"/>
               </a:ext>
             </a:extLst>
           </p:cNvPr>
@@ -4370,31 +4316,52 @@
           <a:p>
             <a:r>
               <a:rPr lang="en-GB" dirty="0"/>
-              <a:t>Detailed and realistic project plans</a:t>
-            </a:r>
-          </a:p>
-          <a:p>
-            <a:r>
-              <a:rPr lang="en-GB" dirty="0"/>
-              <a:t>Team and Individual engagement with OP</a:t>
-            </a:r>
-          </a:p>
-          <a:p>
-            <a:r>
-              <a:rPr lang="en-GB" dirty="0"/>
-              <a:t>Individual contribution to work packages</a:t>
-            </a:r>
-          </a:p>
-          <a:p>
-            <a:r>
-              <a:rPr lang="en-GB" dirty="0"/>
-              <a:t>Individual attendance at project meetings</a:t>
-            </a:r>
-          </a:p>
-          <a:p>
-            <a:r>
-              <a:rPr lang="en-GB" dirty="0"/>
-              <a:t>Keeping to due-dates, milestones and deadlines</a:t>
+              <a:t>OP provides us with PROJECT TRANSPARENCY</a:t>
+            </a:r>
+          </a:p>
+          <a:p>
+            <a:r>
+              <a:rPr lang="en-GB" dirty="0"/>
+              <a:t>We can see WHAT you are up to and WHEN</a:t>
+            </a:r>
+          </a:p>
+          <a:p>
+            <a:r>
+              <a:rPr lang="en-GB" dirty="0"/>
+              <a:t>This has a number of “benefits”…</a:t>
+            </a:r>
+          </a:p>
+          <a:p>
+            <a:endParaRPr lang="en-GB" dirty="0"/>
+          </a:p>
+          <a:p>
+            <a:r>
+              <a:rPr lang="en-GB" dirty="0"/>
+              <a:t>We can monitor the patterns and flow of work</a:t>
+            </a:r>
+          </a:p>
+          <a:p>
+            <a:r>
+              <a:rPr lang="en-GB" dirty="0"/>
+              <a:t>We can spot problems early on</a:t>
+            </a:r>
+          </a:p>
+          <a:p>
+            <a:r>
+              <a:rPr lang="en-GB" dirty="0"/>
+              <a:t>We can “encourage” when work is falling behind</a:t>
+            </a:r>
+          </a:p>
+          <a:p>
+            <a:r>
+              <a:rPr lang="en-GB" dirty="0"/>
+              <a:t>We can tell if people aren’t pulling their weight</a:t>
+            </a:r>
+          </a:p>
+          <a:p>
+            <a:r>
+              <a:rPr lang="en-GB" dirty="0"/>
+              <a:t>We can mark teams on process, as well as product</a:t>
             </a:r>
           </a:p>
         </p:txBody>
@@ -4402,7 +4369,7 @@
     </p:spTree>
     <p:extLst>
       <p:ext uri="{BB962C8B-B14F-4D97-AF65-F5344CB8AC3E}">
-        <p14:creationId xmlns:p14="http://schemas.microsoft.com/office/powerpoint/2010/main" val="1530531459"/>
+        <p14:creationId xmlns:p14="http://schemas.microsoft.com/office/powerpoint/2010/main" val="1574101972"/>
       </p:ext>
     </p:extLst>
   </p:cSld>
@@ -4434,7 +4401,7 @@
           <p:cNvPr id="2" name="Title 1">
             <a:extLst>
               <a:ext uri="{FF2B5EF4-FFF2-40B4-BE49-F238E27FC236}">
-                <a16:creationId xmlns:a16="http://schemas.microsoft.com/office/drawing/2014/main" id="{A10943E5-00F9-44CE-A3EF-B6F2580361D8}"/>
+                <a16:creationId xmlns:a16="http://schemas.microsoft.com/office/drawing/2014/main" id="{F35733BB-C782-4634-A539-8D44F26FC7A3}"/>
               </a:ext>
             </a:extLst>
           </p:cNvPr>
@@ -4452,7 +4419,7 @@
           <a:p>
             <a:r>
               <a:rPr lang="en-GB" dirty="0"/>
-              <a:t>Warning</a:t>
+              <a:t>Specific things we will be looking for</a:t>
             </a:r>
           </a:p>
         </p:txBody>
@@ -4462,7 +4429,7 @@
           <p:cNvPr id="3" name="Content Placeholder 2">
             <a:extLst>
               <a:ext uri="{FF2B5EF4-FFF2-40B4-BE49-F238E27FC236}">
-                <a16:creationId xmlns:a16="http://schemas.microsoft.com/office/drawing/2014/main" id="{85D63A4F-810B-40EF-B5E0-815BAC478468}"/>
+                <a16:creationId xmlns:a16="http://schemas.microsoft.com/office/drawing/2014/main" id="{9E1EE52C-534F-4676-84E9-980717139303}"/>
               </a:ext>
             </a:extLst>
           </p:cNvPr>
@@ -4475,49 +4442,36 @@
         </p:nvSpPr>
         <p:spPr/>
         <p:txBody>
-          <a:bodyPr>
-            <a:normAutofit/>
-          </a:bodyPr>
-          <a:lstStyle/>
-          <a:p>
-            <a:r>
-              <a:rPr lang="en-GB" dirty="0"/>
-              <a:t>You MUST use open-project to its full potential…</a:t>
-            </a:r>
-          </a:p>
-          <a:p>
-            <a:pPr lvl="0"/>
-            <a:r>
-              <a:rPr lang="en-GB" dirty="0"/>
-              <a:t>If there is work to be done, it must appear as a work package (with a realistic estimate of hours)</a:t>
-            </a:r>
-          </a:p>
-          <a:p>
-            <a:pPr lvl="0"/>
-            <a:r>
-              <a:rPr lang="en-GB" dirty="0"/>
-              <a:t>If you are doing that work, you must be recorded as the assignee</a:t>
-            </a:r>
-          </a:p>
-          <a:p>
-            <a:pPr lvl="0"/>
-            <a:r>
-              <a:rPr lang="en-GB" dirty="0"/>
-              <a:t>When work is progressing, you must update the progress % and status (so we can see !)</a:t>
-            </a:r>
-          </a:p>
-          <a:p>
-            <a:pPr lvl="0"/>
-            <a:r>
-              <a:rPr lang="en-GB" dirty="0"/>
-              <a:t>If there is a meeting, it must be entered</a:t>
-            </a:r>
-          </a:p>
-          <a:p>
-            <a:pPr lvl="0"/>
-            <a:r>
-              <a:rPr lang="en-GB" dirty="0"/>
-              <a:t>If someone missed a meeting, it must be recorded</a:t>
+          <a:bodyPr/>
+          <a:lstStyle/>
+          <a:p>
+            <a:r>
+              <a:rPr lang="en-GB" dirty="0"/>
+              <a:t>Detailed and realistic project plans</a:t>
+            </a:r>
+          </a:p>
+          <a:p>
+            <a:r>
+              <a:rPr lang="en-GB" dirty="0"/>
+              <a:t>Team and Individual engagement with OP</a:t>
+            </a:r>
+          </a:p>
+          <a:p>
+            <a:r>
+              <a:rPr lang="en-GB" dirty="0"/>
+              <a:t>Individual contribution to work packages</a:t>
+            </a:r>
+          </a:p>
+          <a:p>
+            <a:r>
+              <a:rPr lang="en-GB" dirty="0"/>
+              <a:t>Individual attendance at project meetings</a:t>
+            </a:r>
+          </a:p>
+          <a:p>
+            <a:r>
+              <a:rPr lang="en-GB" dirty="0"/>
+              <a:t>Keeping to due-dates, milestones and deadlines</a:t>
             </a:r>
           </a:p>
         </p:txBody>
@@ -4525,7 +4479,7 @@
     </p:spTree>
     <p:extLst>
       <p:ext uri="{BB962C8B-B14F-4D97-AF65-F5344CB8AC3E}">
-        <p14:creationId xmlns:p14="http://schemas.microsoft.com/office/powerpoint/2010/main" val="722418536"/>
+        <p14:creationId xmlns:p14="http://schemas.microsoft.com/office/powerpoint/2010/main" val="1530531459"/>
       </p:ext>
     </p:extLst>
   </p:cSld>
@@ -4557,6 +4511,129 @@
           <p:cNvPr id="2" name="Title 1">
             <a:extLst>
               <a:ext uri="{FF2B5EF4-FFF2-40B4-BE49-F238E27FC236}">
+                <a16:creationId xmlns:a16="http://schemas.microsoft.com/office/drawing/2014/main" id="{A10943E5-00F9-44CE-A3EF-B6F2580361D8}"/>
+              </a:ext>
+            </a:extLst>
+          </p:cNvPr>
+          <p:cNvSpPr>
+            <a:spLocks noGrp="1"/>
+          </p:cNvSpPr>
+          <p:nvPr>
+            <p:ph type="title"/>
+          </p:nvPr>
+        </p:nvSpPr>
+        <p:spPr/>
+        <p:txBody>
+          <a:bodyPr/>
+          <a:lstStyle/>
+          <a:p>
+            <a:r>
+              <a:rPr lang="en-GB" dirty="0"/>
+              <a:t>Warning: Capture Data !</a:t>
+            </a:r>
+          </a:p>
+        </p:txBody>
+      </p:sp>
+      <p:sp>
+        <p:nvSpPr>
+          <p:cNvPr id="3" name="Content Placeholder 2">
+            <a:extLst>
+              <a:ext uri="{FF2B5EF4-FFF2-40B4-BE49-F238E27FC236}">
+                <a16:creationId xmlns:a16="http://schemas.microsoft.com/office/drawing/2014/main" id="{85D63A4F-810B-40EF-B5E0-815BAC478468}"/>
+              </a:ext>
+            </a:extLst>
+          </p:cNvPr>
+          <p:cNvSpPr>
+            <a:spLocks noGrp="1"/>
+          </p:cNvSpPr>
+          <p:nvPr>
+            <p:ph idx="1"/>
+          </p:nvPr>
+        </p:nvSpPr>
+        <p:spPr/>
+        <p:txBody>
+          <a:bodyPr>
+            <a:normAutofit/>
+          </a:bodyPr>
+          <a:lstStyle/>
+          <a:p>
+            <a:r>
+              <a:rPr lang="en-GB" dirty="0"/>
+              <a:t>You MUST use open-project to its full potential…</a:t>
+            </a:r>
+          </a:p>
+          <a:p>
+            <a:pPr lvl="0"/>
+            <a:r>
+              <a:rPr lang="en-GB" dirty="0"/>
+              <a:t>If there is work to be done, it must appear as a work package (with a realistic estimate of hours)</a:t>
+            </a:r>
+          </a:p>
+          <a:p>
+            <a:pPr lvl="0"/>
+            <a:r>
+              <a:rPr lang="en-GB" dirty="0"/>
+              <a:t>If you are doing that work, you must be recorded as the assignee</a:t>
+            </a:r>
+          </a:p>
+          <a:p>
+            <a:pPr lvl="0"/>
+            <a:r>
+              <a:rPr lang="en-GB" dirty="0"/>
+              <a:t>When work is progressing, you must update the progress % and status (so we can see !)</a:t>
+            </a:r>
+          </a:p>
+          <a:p>
+            <a:pPr lvl="0"/>
+            <a:r>
+              <a:rPr lang="en-GB" dirty="0"/>
+              <a:t>If there is a meeting, it must be entered</a:t>
+            </a:r>
+          </a:p>
+          <a:p>
+            <a:pPr lvl="0"/>
+            <a:r>
+              <a:rPr lang="en-GB" dirty="0"/>
+              <a:t>If someone missed a meeting, it must be recorded</a:t>
+            </a:r>
+          </a:p>
+        </p:txBody>
+      </p:sp>
+    </p:spTree>
+    <p:extLst>
+      <p:ext uri="{BB962C8B-B14F-4D97-AF65-F5344CB8AC3E}">
+        <p14:creationId xmlns:p14="http://schemas.microsoft.com/office/powerpoint/2010/main" val="722418536"/>
+      </p:ext>
+    </p:extLst>
+  </p:cSld>
+  <p:clrMapOvr>
+    <a:masterClrMapping/>
+  </p:clrMapOvr>
+</p:sld>
+</file>
+
+<file path=ppt/slides/slide23.xml><?xml version="1.0" encoding="utf-8"?>
+<p:sld xmlns:a="http://schemas.openxmlformats.org/drawingml/2006/main" xmlns:r="http://schemas.openxmlformats.org/officeDocument/2006/relationships" xmlns:p="http://schemas.openxmlformats.org/presentationml/2006/main">
+  <p:cSld>
+    <p:spTree>
+      <p:nvGrpSpPr>
+        <p:cNvPr id="1" name=""/>
+        <p:cNvGrpSpPr/>
+        <p:nvPr/>
+      </p:nvGrpSpPr>
+      <p:grpSpPr>
+        <a:xfrm>
+          <a:off x="0" y="0"/>
+          <a:ext cx="0" cy="0"/>
+          <a:chOff x="0" y="0"/>
+          <a:chExt cx="0" cy="0"/>
+        </a:xfrm>
+      </p:grpSpPr>
+      <p:sp>
+        <p:nvSpPr>
+          <p:cNvPr id="2" name="Title 1">
+            <a:extLst>
+              <a:ext uri="{FF2B5EF4-FFF2-40B4-BE49-F238E27FC236}">
                 <a16:creationId xmlns:a16="http://schemas.microsoft.com/office/drawing/2014/main" id="{1865A318-3592-45F2-A594-BA5036F16B26}"/>
               </a:ext>
             </a:extLst>
@@ -4607,8 +4684,23 @@
               <a:buNone/>
             </a:pPr>
             <a:r>
-              <a:rPr lang="en-GB" sz="3200" dirty="0"/>
-              <a:t>Recording information accurately is essential so that we can keep track of progress and identify “under engagement”. When we come to mark the coursework, these issues will impact the individual grades that students will be awarded.</a:t>
+              <a:rPr lang="en-GB" sz="2800" dirty="0"/>
+              <a:t>Recording information accurately is essential so that we can keep track of progress and identify “under engagement”.</a:t>
+            </a:r>
+          </a:p>
+          <a:p>
+            <a:pPr marL="0" indent="0" algn="ctr">
+              <a:buNone/>
+            </a:pPr>
+            <a:endParaRPr lang="en-GB" sz="2800" dirty="0"/>
+          </a:p>
+          <a:p>
+            <a:pPr marL="0" indent="0" algn="ctr">
+              <a:buNone/>
+            </a:pPr>
+            <a:r>
+              <a:rPr lang="en-GB" sz="2800" dirty="0"/>
+              <a:t>When we come to mark the projects at the end of the year, these issues will impact the individual grades students will be awarded.</a:t>
             </a:r>
           </a:p>
         </p:txBody>
@@ -4626,7 +4718,135 @@
 </p:sld>
 </file>
 
-<file path=ppt/slides/slide23.xml><?xml version="1.0" encoding="utf-8"?>
+<file path=ppt/slides/slide24.xml><?xml version="1.0" encoding="utf-8"?>
+<p:sld xmlns:a="http://schemas.openxmlformats.org/drawingml/2006/main" xmlns:r="http://schemas.openxmlformats.org/officeDocument/2006/relationships" xmlns:p="http://schemas.openxmlformats.org/presentationml/2006/main">
+  <p:cSld>
+    <p:spTree>
+      <p:nvGrpSpPr>
+        <p:cNvPr id="1" name=""/>
+        <p:cNvGrpSpPr/>
+        <p:nvPr/>
+      </p:nvGrpSpPr>
+      <p:grpSpPr>
+        <a:xfrm>
+          <a:off x="0" y="0"/>
+          <a:ext cx="0" cy="0"/>
+          <a:chOff x="0" y="0"/>
+          <a:chExt cx="0" cy="0"/>
+        </a:xfrm>
+      </p:grpSpPr>
+      <p:sp>
+        <p:nvSpPr>
+          <p:cNvPr id="2" name="Title 1">
+            <a:extLst>
+              <a:ext uri="{FF2B5EF4-FFF2-40B4-BE49-F238E27FC236}">
+                <a16:creationId xmlns:a16="http://schemas.microsoft.com/office/drawing/2014/main" id="{8C31094E-49AB-4594-BB34-42937658BA61}"/>
+              </a:ext>
+            </a:extLst>
+          </p:cNvPr>
+          <p:cNvSpPr>
+            <a:spLocks noGrp="1"/>
+          </p:cNvSpPr>
+          <p:nvPr>
+            <p:ph type="title"/>
+          </p:nvPr>
+        </p:nvSpPr>
+        <p:spPr/>
+        <p:txBody>
+          <a:bodyPr/>
+          <a:lstStyle/>
+          <a:p>
+            <a:r>
+              <a:rPr lang="en-GB" dirty="0"/>
+              <a:t>This is not a normal unit !</a:t>
+            </a:r>
+          </a:p>
+        </p:txBody>
+      </p:sp>
+      <p:sp>
+        <p:nvSpPr>
+          <p:cNvPr id="3" name="Content Placeholder 2">
+            <a:extLst>
+              <a:ext uri="{FF2B5EF4-FFF2-40B4-BE49-F238E27FC236}">
+                <a16:creationId xmlns:a16="http://schemas.microsoft.com/office/drawing/2014/main" id="{EB718C4B-6318-433D-B34B-B3400F49E898}"/>
+              </a:ext>
+            </a:extLst>
+          </p:cNvPr>
+          <p:cNvSpPr>
+            <a:spLocks noGrp="1"/>
+          </p:cNvSpPr>
+          <p:nvPr>
+            <p:ph idx="1"/>
+          </p:nvPr>
+        </p:nvSpPr>
+        <p:spPr/>
+        <p:txBody>
+          <a:bodyPr/>
+          <a:lstStyle/>
+          <a:p>
+            <a:r>
+              <a:rPr lang="en-GB" dirty="0"/>
+              <a:t>You can’t just attend passively</a:t>
+            </a:r>
+          </a:p>
+          <a:p>
+            <a:r>
+              <a:rPr lang="en-GB" dirty="0"/>
+              <a:t>Then work hard on assignment/exam at the end</a:t>
+            </a:r>
+          </a:p>
+          <a:p>
+            <a:endParaRPr lang="en-GB" dirty="0"/>
+          </a:p>
+          <a:p>
+            <a:r>
+              <a:rPr lang="en-GB" dirty="0"/>
+              <a:t>You need to proactivity engage and DO stuff</a:t>
+            </a:r>
+          </a:p>
+          <a:p>
+            <a:r>
+              <a:rPr lang="en-GB" dirty="0"/>
+              <a:t>Throughout the whole of the unit</a:t>
+            </a:r>
+          </a:p>
+          <a:p>
+            <a:r>
+              <a:rPr lang="en-GB" dirty="0"/>
+              <a:t>Fight for work – grab hold of tasks you excel at</a:t>
+            </a:r>
+          </a:p>
+          <a:p>
+            <a:endParaRPr lang="en-GB" dirty="0"/>
+          </a:p>
+          <a:p>
+            <a:r>
+              <a:rPr lang="en-GB" dirty="0"/>
+              <a:t>This may be an familiar behaviour for some</a:t>
+            </a:r>
+          </a:p>
+          <a:p>
+            <a:r>
+              <a:rPr lang="en-GB" dirty="0"/>
+              <a:t>Which is why we have introduced a prompt…</a:t>
+            </a:r>
+          </a:p>
+        </p:txBody>
+      </p:sp>
+    </p:spTree>
+    <p:extLst>
+      <p:ext uri="{BB962C8B-B14F-4D97-AF65-F5344CB8AC3E}">
+        <p14:creationId xmlns:p14="http://schemas.microsoft.com/office/powerpoint/2010/main" val="3568784488"/>
+      </p:ext>
+    </p:extLst>
+  </p:cSld>
+  <p:clrMapOvr>
+    <a:masterClrMapping/>
+  </p:clrMapOvr>
+</p:sld>
+</file>
+
+<file path=ppt/slides/slide25.xml><?xml version="1.0" encoding="utf-8"?>
 <p:sld xmlns:a="http://schemas.openxmlformats.org/drawingml/2006/main" xmlns:r="http://schemas.openxmlformats.org/officeDocument/2006/relationships" xmlns:p="http://schemas.openxmlformats.org/presentationml/2006/main">
   <p:cSld>
     <p:spTree>
@@ -4980,7 +5200,7 @@
           <a:p>
             <a:r>
               <a:rPr lang="en-GB" dirty="0"/>
-              <a:t>We have set up a hosted OP instance:</a:t>
+              <a:t>You can access Open Project at this URL:</a:t>
             </a:r>
           </a:p>
           <a:p>
@@ -5001,19 +5221,19 @@
           <a:p>
             <a:r>
               <a:rPr lang="en-GB" dirty="0"/>
-              <a:t>Each team will have a project already created</a:t>
-            </a:r>
-          </a:p>
-          <a:p>
-            <a:r>
-              <a:rPr lang="en-GB" dirty="0"/>
-              <a:t>You will be send an invite to join OP</a:t>
-            </a:r>
-          </a:p>
-          <a:p>
-            <a:r>
-              <a:rPr lang="en-GB" dirty="0"/>
-              <a:t>You should already be added to your project</a:t>
+              <a:t>Each team will have a project created for them</a:t>
+            </a:r>
+          </a:p>
+          <a:p>
+            <a:r>
+              <a:rPr lang="en-GB" dirty="0"/>
+              <a:t>You will be sent an invite to join OP</a:t>
+            </a:r>
+          </a:p>
+          <a:p>
+            <a:r>
+              <a:rPr lang="en-GB" dirty="0"/>
+              <a:t>You should already be added to your project !</a:t>
             </a:r>
           </a:p>
         </p:txBody>
@@ -5071,7 +5291,7 @@
           <a:p>
             <a:r>
               <a:rPr lang="en-GB" dirty="0"/>
-              <a:t>Getting Started with OP</a:t>
+              <a:t>“Getting started” within OP</a:t>
             </a:r>
           </a:p>
         </p:txBody>
@@ -5125,13 +5345,13 @@
           <a:p>
             <a:r>
               <a:rPr lang="en-GB" dirty="0"/>
+              <a:t>Create an activity timeline</a:t>
+            </a:r>
+          </a:p>
+          <a:p>
+            <a:r>
+              <a:rPr lang="en-GB" dirty="0"/>
               <a:t>Add work package dependencies</a:t>
-            </a:r>
-          </a:p>
-          <a:p>
-            <a:r>
-              <a:rPr lang="en-GB" dirty="0"/>
-              <a:t>Create an activity timeline</a:t>
             </a:r>
           </a:p>
           <a:p>
@@ -5232,7 +5452,7 @@
             </a:pPr>
             <a:r>
               <a:rPr lang="en-GB" dirty="0"/>
-              <a:t>A project in OP is based around work packages</a:t>
+              <a:t>A project in OP is based around “work packages”</a:t>
             </a:r>
           </a:p>
           <a:p>
@@ -5487,7 +5707,7 @@
         </p:blipFill>
         <p:spPr>
           <a:xfrm>
-            <a:off x="0" y="897993"/>
+            <a:off x="0" y="1676926"/>
             <a:ext cx="9119478" cy="4565827"/>
           </a:xfrm>
           <a:prstGeom prst="rect">
@@ -5495,6 +5715,43 @@
           </a:prstGeom>
         </p:spPr>
       </p:pic>
+      <p:sp>
+        <p:nvSpPr>
+          <p:cNvPr id="3" name="Title 1">
+            <a:extLst>
+              <a:ext uri="{FF2B5EF4-FFF2-40B4-BE49-F238E27FC236}">
+                <a16:creationId xmlns:a16="http://schemas.microsoft.com/office/drawing/2014/main" id="{84CF5B99-A024-4B0B-9B1C-889B241E986C}"/>
+              </a:ext>
+            </a:extLst>
+          </p:cNvPr>
+          <p:cNvSpPr>
+            <a:spLocks noGrp="1"/>
+          </p:cNvSpPr>
+          <p:nvPr>
+            <p:ph type="title"/>
+          </p:nvPr>
+        </p:nvSpPr>
+        <p:spPr>
+          <a:xfrm>
+            <a:off x="628650" y="365126"/>
+            <a:ext cx="7886700" cy="1325563"/>
+          </a:xfrm>
+        </p:spPr>
+        <p:txBody>
+          <a:bodyPr/>
+          <a:lstStyle/>
+          <a:p>
+            <a:r>
+              <a:rPr lang="en-GB" dirty="0">
+                <a:solidFill>
+                  <a:schemeClr val="tx1"/>
+                </a:solidFill>
+              </a:rPr>
+              <a:t>Activity Timeline (Gantt chart)</a:t>
+            </a:r>
+          </a:p>
+        </p:txBody>
+      </p:sp>
     </p:spTree>
     <p:extLst>
       <p:ext uri="{BB962C8B-B14F-4D97-AF65-F5344CB8AC3E}">

</xml_diff>

<commit_message>
Added OP activity timeline
</commit_message>
<xml_diff>
--- a/Lecture Slides/02 Open Project.pptx
+++ b/Lecture Slides/02 Open Project.pptx
@@ -30,6 +30,9 @@
     <p:sldId id="273" r:id="rId24"/>
     <p:sldId id="282" r:id="rId25"/>
     <p:sldId id="280" r:id="rId26"/>
+    <p:sldId id="285" r:id="rId27"/>
+    <p:sldId id="283" r:id="rId28"/>
+    <p:sldId id="284" r:id="rId29"/>
   </p:sldIdLst>
   <p:sldSz cx="9144000" cy="6858000" type="screen4x3"/>
   <p:notesSz cx="7559675" cy="10691813"/>
@@ -265,7 +268,7 @@
           <a:p>
             <a:fld id="{5896A8B8-A7CB-914F-A9DE-93D0CA668D65}" type="datetimeFigureOut">
               <a:rPr lang="en-US" smtClean="0"/>
-              <a:t>9/26/2018</a:t>
+              <a:t>10/1/2018</a:t>
             </a:fld>
             <a:endParaRPr lang="en-US"/>
           </a:p>
@@ -428,7 +431,7 @@
           <a:p>
             <a:fld id="{5896A8B8-A7CB-914F-A9DE-93D0CA668D65}" type="datetimeFigureOut">
               <a:rPr lang="en-US" smtClean="0"/>
-              <a:t>9/26/2018</a:t>
+              <a:t>10/1/2018</a:t>
             </a:fld>
             <a:endParaRPr lang="en-US"/>
           </a:p>
@@ -601,7 +604,7 @@
           <a:p>
             <a:fld id="{5896A8B8-A7CB-914F-A9DE-93D0CA668D65}" type="datetimeFigureOut">
               <a:rPr lang="en-US" smtClean="0"/>
-              <a:t>9/26/2018</a:t>
+              <a:t>10/1/2018</a:t>
             </a:fld>
             <a:endParaRPr lang="en-US"/>
           </a:p>
@@ -812,7 +815,7 @@
           <a:p>
             <a:fld id="{5896A8B8-A7CB-914F-A9DE-93D0CA668D65}" type="datetimeFigureOut">
               <a:rPr lang="en-US" smtClean="0"/>
-              <a:t>9/26/2018</a:t>
+              <a:t>10/1/2018</a:t>
             </a:fld>
             <a:endParaRPr lang="en-US"/>
           </a:p>
@@ -1052,7 +1055,7 @@
           <a:p>
             <a:fld id="{5896A8B8-A7CB-914F-A9DE-93D0CA668D65}" type="datetimeFigureOut">
               <a:rPr lang="en-US" smtClean="0"/>
-              <a:t>9/26/2018</a:t>
+              <a:t>10/1/2018</a:t>
             </a:fld>
             <a:endParaRPr lang="en-US"/>
           </a:p>
@@ -1276,7 +1279,7 @@
           <a:p>
             <a:fld id="{5896A8B8-A7CB-914F-A9DE-93D0CA668D65}" type="datetimeFigureOut">
               <a:rPr lang="en-US" smtClean="0"/>
-              <a:t>9/26/2018</a:t>
+              <a:t>10/1/2018</a:t>
             </a:fld>
             <a:endParaRPr lang="en-US"/>
           </a:p>
@@ -1635,7 +1638,7 @@
           <a:p>
             <a:fld id="{5896A8B8-A7CB-914F-A9DE-93D0CA668D65}" type="datetimeFigureOut">
               <a:rPr lang="en-US" smtClean="0"/>
-              <a:t>9/26/2018</a:t>
+              <a:t>10/1/2018</a:t>
             </a:fld>
             <a:endParaRPr lang="en-US"/>
           </a:p>
@@ -1747,7 +1750,7 @@
           <a:p>
             <a:fld id="{5896A8B8-A7CB-914F-A9DE-93D0CA668D65}" type="datetimeFigureOut">
               <a:rPr lang="en-US" smtClean="0"/>
-              <a:t>9/26/2018</a:t>
+              <a:t>10/1/2018</a:t>
             </a:fld>
             <a:endParaRPr lang="en-US"/>
           </a:p>
@@ -1837,7 +1840,7 @@
           <a:p>
             <a:fld id="{5896A8B8-A7CB-914F-A9DE-93D0CA668D65}" type="datetimeFigureOut">
               <a:rPr lang="en-US" smtClean="0"/>
-              <a:t>9/26/2018</a:t>
+              <a:t>10/1/2018</a:t>
             </a:fld>
             <a:endParaRPr lang="en-US"/>
           </a:p>
@@ -2107,7 +2110,7 @@
           <a:p>
             <a:fld id="{5896A8B8-A7CB-914F-A9DE-93D0CA668D65}" type="datetimeFigureOut">
               <a:rPr lang="en-US" smtClean="0"/>
-              <a:t>9/26/2018</a:t>
+              <a:t>10/1/2018</a:t>
             </a:fld>
             <a:endParaRPr lang="en-US"/>
           </a:p>
@@ -2354,7 +2357,7 @@
           <a:p>
             <a:fld id="{5896A8B8-A7CB-914F-A9DE-93D0CA668D65}" type="datetimeFigureOut">
               <a:rPr lang="en-US" smtClean="0"/>
-              <a:t>9/26/2018</a:t>
+              <a:t>10/1/2018</a:t>
             </a:fld>
             <a:endParaRPr lang="en-US"/>
           </a:p>
@@ -2562,7 +2565,7 @@
             <a:fld id="{5896A8B8-A7CB-914F-A9DE-93D0CA668D65}" type="datetimeFigureOut">
               <a:rPr lang="en-US" smtClean="0"/>
               <a:pPr/>
-              <a:t>9/26/2018</a:t>
+              <a:t>10/1/2018</a:t>
             </a:fld>
             <a:endParaRPr lang="en-US"/>
           </a:p>
@@ -4983,6 +4986,659 @@
 </p:sld>
 </file>
 
+<file path=ppt/slides/slide26.xml><?xml version="1.0" encoding="utf-8"?>
+<p:sld xmlns:a="http://schemas.openxmlformats.org/drawingml/2006/main" xmlns:r="http://schemas.openxmlformats.org/officeDocument/2006/relationships" xmlns:p="http://schemas.openxmlformats.org/presentationml/2006/main">
+  <p:cSld>
+    <p:spTree>
+      <p:nvGrpSpPr>
+        <p:cNvPr id="1" name=""/>
+        <p:cNvGrpSpPr/>
+        <p:nvPr/>
+      </p:nvGrpSpPr>
+      <p:grpSpPr>
+        <a:xfrm>
+          <a:off x="0" y="0"/>
+          <a:ext cx="0" cy="0"/>
+          <a:chOff x="0" y="0"/>
+          <a:chExt cx="0" cy="0"/>
+        </a:xfrm>
+      </p:grpSpPr>
+      <p:sp>
+        <p:nvSpPr>
+          <p:cNvPr id="4" name="Title 3">
+            <a:extLst>
+              <a:ext uri="{FF2B5EF4-FFF2-40B4-BE49-F238E27FC236}">
+                <a16:creationId xmlns:a16="http://schemas.microsoft.com/office/drawing/2014/main" id="{0BAD0073-1AA0-4CE0-B3C4-6870718C2810}"/>
+              </a:ext>
+            </a:extLst>
+          </p:cNvPr>
+          <p:cNvSpPr>
+            <a:spLocks noGrp="1"/>
+          </p:cNvSpPr>
+          <p:nvPr>
+            <p:ph type="title"/>
+          </p:nvPr>
+        </p:nvSpPr>
+        <p:spPr/>
+        <p:txBody>
+          <a:bodyPr/>
+          <a:lstStyle/>
+          <a:p>
+            <a:r>
+              <a:rPr lang="en-GB" dirty="0"/>
+              <a:t>Example Activity Timeline ?</a:t>
+            </a:r>
+          </a:p>
+        </p:txBody>
+      </p:sp>
+      <p:sp>
+        <p:nvSpPr>
+          <p:cNvPr id="5" name="Text Placeholder 4">
+            <a:extLst>
+              <a:ext uri="{FF2B5EF4-FFF2-40B4-BE49-F238E27FC236}">
+                <a16:creationId xmlns:a16="http://schemas.microsoft.com/office/drawing/2014/main" id="{0DBBDBC0-4D3C-4CD3-8C80-BB73B8B409EE}"/>
+              </a:ext>
+            </a:extLst>
+          </p:cNvPr>
+          <p:cNvSpPr>
+            <a:spLocks noGrp="1"/>
+          </p:cNvSpPr>
+          <p:nvPr>
+            <p:ph type="body" idx="1"/>
+          </p:nvPr>
+        </p:nvSpPr>
+        <p:spPr/>
+        <p:txBody>
+          <a:bodyPr/>
+          <a:lstStyle/>
+          <a:p>
+            <a:endParaRPr lang="en-GB"/>
+          </a:p>
+        </p:txBody>
+      </p:sp>
+    </p:spTree>
+    <p:extLst>
+      <p:ext uri="{BB962C8B-B14F-4D97-AF65-F5344CB8AC3E}">
+        <p14:creationId xmlns:p14="http://schemas.microsoft.com/office/powerpoint/2010/main" val="1019443653"/>
+      </p:ext>
+    </p:extLst>
+  </p:cSld>
+  <p:clrMapOvr>
+    <a:masterClrMapping/>
+  </p:clrMapOvr>
+</p:sld>
+</file>
+
+<file path=ppt/slides/slide27.xml><?xml version="1.0" encoding="utf-8"?>
+<p:sld xmlns:a="http://schemas.openxmlformats.org/drawingml/2006/main" xmlns:r="http://schemas.openxmlformats.org/officeDocument/2006/relationships" xmlns:p="http://schemas.openxmlformats.org/presentationml/2006/main">
+  <p:cSld>
+    <p:spTree>
+      <p:nvGrpSpPr>
+        <p:cNvPr id="1" name=""/>
+        <p:cNvGrpSpPr/>
+        <p:nvPr/>
+      </p:nvGrpSpPr>
+      <p:grpSpPr>
+        <a:xfrm>
+          <a:off x="0" y="0"/>
+          <a:ext cx="0" cy="0"/>
+          <a:chOff x="0" y="0"/>
+          <a:chExt cx="0" cy="0"/>
+        </a:xfrm>
+      </p:grpSpPr>
+      <p:sp>
+        <p:nvSpPr>
+          <p:cNvPr id="8" name="Rectangle 7">
+            <a:extLst>
+              <a:ext uri="{FF2B5EF4-FFF2-40B4-BE49-F238E27FC236}">
+                <a16:creationId xmlns:a16="http://schemas.microsoft.com/office/drawing/2014/main" id="{08E22B6B-5186-4A8E-826B-AF9C74C66616}"/>
+              </a:ext>
+            </a:extLst>
+          </p:cNvPr>
+          <p:cNvSpPr/>
+          <p:nvPr/>
+        </p:nvSpPr>
+        <p:spPr>
+          <a:xfrm>
+            <a:off x="0" y="0"/>
+            <a:ext cx="9144000" cy="6858000"/>
+          </a:xfrm>
+          <a:prstGeom prst="rect">
+            <a:avLst/>
+          </a:prstGeom>
+          <a:solidFill>
+            <a:srgbClr val="FFFFFF"/>
+          </a:solidFill>
+          <a:ln>
+            <a:noFill/>
+          </a:ln>
+        </p:spPr>
+        <p:style>
+          <a:lnRef idx="2">
+            <a:schemeClr val="accent1">
+              <a:shade val="50000"/>
+            </a:schemeClr>
+          </a:lnRef>
+          <a:fillRef idx="1">
+            <a:schemeClr val="accent1"/>
+          </a:fillRef>
+          <a:effectRef idx="0">
+            <a:schemeClr val="accent1"/>
+          </a:effectRef>
+          <a:fontRef idx="minor">
+            <a:schemeClr val="lt1"/>
+          </a:fontRef>
+        </p:style>
+        <p:txBody>
+          <a:bodyPr rtlCol="0" anchor="ctr"/>
+          <a:lstStyle/>
+          <a:p>
+            <a:pPr algn="ctr"/>
+            <a:endParaRPr lang="en-GB"/>
+          </a:p>
+        </p:txBody>
+      </p:sp>
+      <p:pic>
+        <p:nvPicPr>
+          <p:cNvPr id="5" name="Picture 4">
+            <a:extLst>
+              <a:ext uri="{FF2B5EF4-FFF2-40B4-BE49-F238E27FC236}">
+                <a16:creationId xmlns:a16="http://schemas.microsoft.com/office/drawing/2014/main" id="{F0008D37-2E5B-4A5D-98CC-1B84E881F206}"/>
+              </a:ext>
+            </a:extLst>
+          </p:cNvPr>
+          <p:cNvPicPr>
+            <a:picLocks noChangeAspect="1"/>
+          </p:cNvPicPr>
+          <p:nvPr/>
+        </p:nvPicPr>
+        <p:blipFill>
+          <a:blip r:embed="rId2">
+            <a:extLst>
+              <a:ext uri="{28A0092B-C50C-407E-A947-70E740481C1C}">
+                <a14:useLocalDpi xmlns:a14="http://schemas.microsoft.com/office/drawing/2010/main" val="0"/>
+              </a:ext>
+            </a:extLst>
+          </a:blip>
+          <a:stretch>
+            <a:fillRect/>
+          </a:stretch>
+        </p:blipFill>
+        <p:spPr>
+          <a:xfrm>
+            <a:off x="1361551" y="22578"/>
+            <a:ext cx="6354366" cy="3429000"/>
+          </a:xfrm>
+          <a:prstGeom prst="rect">
+            <a:avLst/>
+          </a:prstGeom>
+        </p:spPr>
+      </p:pic>
+      <p:pic>
+        <p:nvPicPr>
+          <p:cNvPr id="7" name="Picture 6">
+            <a:extLst>
+              <a:ext uri="{FF2B5EF4-FFF2-40B4-BE49-F238E27FC236}">
+                <a16:creationId xmlns:a16="http://schemas.microsoft.com/office/drawing/2014/main" id="{A1EEBA6E-F51D-4665-86C8-96E00045A6BC}"/>
+              </a:ext>
+            </a:extLst>
+          </p:cNvPr>
+          <p:cNvPicPr>
+            <a:picLocks noChangeAspect="1"/>
+          </p:cNvPicPr>
+          <p:nvPr/>
+        </p:nvPicPr>
+        <p:blipFill rotWithShape="1">
+          <a:blip r:embed="rId3">
+            <a:extLst>
+              <a:ext uri="{28A0092B-C50C-407E-A947-70E740481C1C}">
+                <a14:useLocalDpi xmlns:a14="http://schemas.microsoft.com/office/drawing/2010/main" val="0"/>
+              </a:ext>
+            </a:extLst>
+          </a:blip>
+          <a:srcRect l="6608" r="908"/>
+          <a:stretch/>
+        </p:blipFill>
+        <p:spPr>
+          <a:xfrm>
+            <a:off x="1361551" y="3409638"/>
+            <a:ext cx="6354366" cy="3430060"/>
+          </a:xfrm>
+          <a:prstGeom prst="rect">
+            <a:avLst/>
+          </a:prstGeom>
+        </p:spPr>
+      </p:pic>
+    </p:spTree>
+    <p:extLst>
+      <p:ext uri="{BB962C8B-B14F-4D97-AF65-F5344CB8AC3E}">
+        <p14:creationId xmlns:p14="http://schemas.microsoft.com/office/powerpoint/2010/main" val="1502517465"/>
+      </p:ext>
+    </p:extLst>
+  </p:cSld>
+  <p:clrMapOvr>
+    <a:masterClrMapping/>
+  </p:clrMapOvr>
+</p:sld>
+</file>
+
+<file path=ppt/slides/slide28.xml><?xml version="1.0" encoding="utf-8"?>
+<p:sld xmlns:a="http://schemas.openxmlformats.org/drawingml/2006/main" xmlns:r="http://schemas.openxmlformats.org/officeDocument/2006/relationships" xmlns:p="http://schemas.openxmlformats.org/presentationml/2006/main">
+  <p:cSld>
+    <p:spTree>
+      <p:nvGrpSpPr>
+        <p:cNvPr id="1" name=""/>
+        <p:cNvGrpSpPr/>
+        <p:nvPr/>
+      </p:nvGrpSpPr>
+      <p:grpSpPr>
+        <a:xfrm>
+          <a:off x="0" y="0"/>
+          <a:ext cx="0" cy="0"/>
+          <a:chOff x="0" y="0"/>
+          <a:chExt cx="0" cy="0"/>
+        </a:xfrm>
+      </p:grpSpPr>
+      <p:sp>
+        <p:nvSpPr>
+          <p:cNvPr id="9" name="Rectangle 8">
+            <a:extLst>
+              <a:ext uri="{FF2B5EF4-FFF2-40B4-BE49-F238E27FC236}">
+                <a16:creationId xmlns:a16="http://schemas.microsoft.com/office/drawing/2014/main" id="{F8FC36A5-E3F0-477D-8FCB-322F7C690CEA}"/>
+              </a:ext>
+            </a:extLst>
+          </p:cNvPr>
+          <p:cNvSpPr/>
+          <p:nvPr/>
+        </p:nvSpPr>
+        <p:spPr>
+          <a:xfrm>
+            <a:off x="0" y="0"/>
+            <a:ext cx="9144000" cy="6858000"/>
+          </a:xfrm>
+          <a:prstGeom prst="rect">
+            <a:avLst/>
+          </a:prstGeom>
+          <a:solidFill>
+            <a:srgbClr val="FFFFFF"/>
+          </a:solidFill>
+          <a:ln>
+            <a:noFill/>
+          </a:ln>
+        </p:spPr>
+        <p:style>
+          <a:lnRef idx="2">
+            <a:schemeClr val="accent1">
+              <a:shade val="50000"/>
+            </a:schemeClr>
+          </a:lnRef>
+          <a:fillRef idx="1">
+            <a:schemeClr val="accent1"/>
+          </a:fillRef>
+          <a:effectRef idx="0">
+            <a:schemeClr val="accent1"/>
+          </a:effectRef>
+          <a:fontRef idx="minor">
+            <a:schemeClr val="lt1"/>
+          </a:fontRef>
+        </p:style>
+        <p:txBody>
+          <a:bodyPr rtlCol="0" anchor="ctr"/>
+          <a:lstStyle/>
+          <a:p>
+            <a:pPr algn="ctr"/>
+            <a:endParaRPr lang="en-GB"/>
+          </a:p>
+        </p:txBody>
+      </p:sp>
+      <p:grpSp>
+        <p:nvGrpSpPr>
+          <p:cNvPr id="2" name="Group 1">
+            <a:extLst>
+              <a:ext uri="{FF2B5EF4-FFF2-40B4-BE49-F238E27FC236}">
+                <a16:creationId xmlns:a16="http://schemas.microsoft.com/office/drawing/2014/main" id="{D26461D4-BE28-4156-93F2-CB67E0998D73}"/>
+              </a:ext>
+            </a:extLst>
+          </p:cNvPr>
+          <p:cNvGrpSpPr/>
+          <p:nvPr/>
+        </p:nvGrpSpPr>
+        <p:grpSpPr>
+          <a:xfrm>
+            <a:off x="587022" y="-3879"/>
+            <a:ext cx="7969956" cy="6861879"/>
+            <a:chOff x="587022" y="-3879"/>
+            <a:chExt cx="7969956" cy="6861879"/>
+          </a:xfrm>
+        </p:grpSpPr>
+        <p:pic>
+          <p:nvPicPr>
+            <p:cNvPr id="6" name="Picture 5">
+              <a:extLst>
+                <a:ext uri="{FF2B5EF4-FFF2-40B4-BE49-F238E27FC236}">
+                  <a16:creationId xmlns:a16="http://schemas.microsoft.com/office/drawing/2014/main" id="{550EC95E-DE0B-48CC-8351-0C8C787B0097}"/>
+                </a:ext>
+              </a:extLst>
+            </p:cNvPr>
+            <p:cNvPicPr>
+              <a:picLocks noChangeAspect="1"/>
+            </p:cNvPicPr>
+            <p:nvPr/>
+          </p:nvPicPr>
+          <p:blipFill rotWithShape="1">
+            <a:blip r:embed="rId2">
+              <a:extLst>
+                <a:ext uri="{28A0092B-C50C-407E-A947-70E740481C1C}">
+                  <a14:useLocalDpi xmlns:a14="http://schemas.microsoft.com/office/drawing/2010/main" val="0"/>
+                </a:ext>
+              </a:extLst>
+            </a:blip>
+            <a:srcRect l="42819" t="2950" r="908"/>
+            <a:stretch/>
+          </p:blipFill>
+          <p:spPr>
+            <a:xfrm>
+              <a:off x="587022" y="-3879"/>
+              <a:ext cx="7969956" cy="6861879"/>
+            </a:xfrm>
+            <a:prstGeom prst="rect">
+              <a:avLst/>
+            </a:prstGeom>
+          </p:spPr>
+        </p:pic>
+        <p:pic>
+          <p:nvPicPr>
+            <p:cNvPr id="10" name="Picture 9">
+              <a:extLst>
+                <a:ext uri="{FF2B5EF4-FFF2-40B4-BE49-F238E27FC236}">
+                  <a16:creationId xmlns:a16="http://schemas.microsoft.com/office/drawing/2014/main" id="{3B7C6597-CAA5-4A7C-A1EC-D9C8083F5FAB}"/>
+                </a:ext>
+              </a:extLst>
+            </p:cNvPr>
+            <p:cNvPicPr>
+              <a:picLocks noChangeAspect="1"/>
+            </p:cNvPicPr>
+            <p:nvPr/>
+          </p:nvPicPr>
+          <p:blipFill rotWithShape="1">
+            <a:blip r:embed="rId2">
+              <a:extLst>
+                <a:ext uri="{28A0092B-C50C-407E-A947-70E740481C1C}">
+                  <a14:useLocalDpi xmlns:a14="http://schemas.microsoft.com/office/drawing/2010/main" val="0"/>
+                </a:ext>
+              </a:extLst>
+            </a:blip>
+            <a:srcRect l="53939" t="32883" r="45264" b="61529"/>
+            <a:stretch/>
+          </p:blipFill>
+          <p:spPr>
+            <a:xfrm>
+              <a:off x="2166937" y="2461088"/>
+              <a:ext cx="112890" cy="395111"/>
+            </a:xfrm>
+            <a:prstGeom prst="rect">
+              <a:avLst/>
+            </a:prstGeom>
+          </p:spPr>
+        </p:pic>
+      </p:grpSp>
+      <p:sp>
+        <p:nvSpPr>
+          <p:cNvPr id="3" name="Rectangle: Rounded Corners 2">
+            <a:extLst>
+              <a:ext uri="{FF2B5EF4-FFF2-40B4-BE49-F238E27FC236}">
+                <a16:creationId xmlns:a16="http://schemas.microsoft.com/office/drawing/2014/main" id="{FED85171-94B3-4DB4-AD62-C9A5D4912A5F}"/>
+              </a:ext>
+            </a:extLst>
+          </p:cNvPr>
+          <p:cNvSpPr/>
+          <p:nvPr/>
+        </p:nvSpPr>
+        <p:spPr>
+          <a:xfrm>
+            <a:off x="1207382" y="2359377"/>
+            <a:ext cx="1230489" cy="598311"/>
+          </a:xfrm>
+          <a:prstGeom prst="roundRect">
+            <a:avLst/>
+          </a:prstGeom>
+          <a:noFill/>
+          <a:ln w="76200">
+            <a:solidFill>
+              <a:srgbClr val="FF0000"/>
+            </a:solidFill>
+          </a:ln>
+        </p:spPr>
+        <p:style>
+          <a:lnRef idx="2">
+            <a:schemeClr val="accent1">
+              <a:shade val="50000"/>
+            </a:schemeClr>
+          </a:lnRef>
+          <a:fillRef idx="1">
+            <a:schemeClr val="accent1"/>
+          </a:fillRef>
+          <a:effectRef idx="0">
+            <a:schemeClr val="accent1"/>
+          </a:effectRef>
+          <a:fontRef idx="minor">
+            <a:schemeClr val="lt1"/>
+          </a:fontRef>
+        </p:style>
+        <p:txBody>
+          <a:bodyPr rtlCol="0" anchor="ctr"/>
+          <a:lstStyle/>
+          <a:p>
+            <a:pPr algn="ctr"/>
+            <a:endParaRPr lang="en-GB"/>
+          </a:p>
+        </p:txBody>
+      </p:sp>
+      <p:sp>
+        <p:nvSpPr>
+          <p:cNvPr id="11" name="Rectangle: Rounded Corners 10">
+            <a:extLst>
+              <a:ext uri="{FF2B5EF4-FFF2-40B4-BE49-F238E27FC236}">
+                <a16:creationId xmlns:a16="http://schemas.microsoft.com/office/drawing/2014/main" id="{CDA81A01-3F4F-4E00-A287-6DBF2D551446}"/>
+              </a:ext>
+            </a:extLst>
+          </p:cNvPr>
+          <p:cNvSpPr/>
+          <p:nvPr/>
+        </p:nvSpPr>
+        <p:spPr>
+          <a:xfrm>
+            <a:off x="3696582" y="1236133"/>
+            <a:ext cx="1230489" cy="598311"/>
+          </a:xfrm>
+          <a:prstGeom prst="roundRect">
+            <a:avLst/>
+          </a:prstGeom>
+          <a:noFill/>
+          <a:ln w="76200">
+            <a:solidFill>
+              <a:srgbClr val="FF0000"/>
+            </a:solidFill>
+          </a:ln>
+        </p:spPr>
+        <p:style>
+          <a:lnRef idx="2">
+            <a:schemeClr val="accent1">
+              <a:shade val="50000"/>
+            </a:schemeClr>
+          </a:lnRef>
+          <a:fillRef idx="1">
+            <a:schemeClr val="accent1"/>
+          </a:fillRef>
+          <a:effectRef idx="0">
+            <a:schemeClr val="accent1"/>
+          </a:effectRef>
+          <a:fontRef idx="minor">
+            <a:schemeClr val="lt1"/>
+          </a:fontRef>
+        </p:style>
+        <p:txBody>
+          <a:bodyPr rtlCol="0" anchor="ctr"/>
+          <a:lstStyle/>
+          <a:p>
+            <a:pPr algn="ctr"/>
+            <a:endParaRPr lang="en-GB"/>
+          </a:p>
+        </p:txBody>
+      </p:sp>
+    </p:spTree>
+    <p:extLst>
+      <p:ext uri="{BB962C8B-B14F-4D97-AF65-F5344CB8AC3E}">
+        <p14:creationId xmlns:p14="http://schemas.microsoft.com/office/powerpoint/2010/main" val="2930698846"/>
+      </p:ext>
+    </p:extLst>
+  </p:cSld>
+  <p:clrMapOvr>
+    <a:masterClrMapping/>
+  </p:clrMapOvr>
+  <p:timing>
+    <p:tnLst>
+      <p:par>
+        <p:cTn id="1" dur="indefinite" restart="never" nodeType="tmRoot">
+          <p:childTnLst>
+            <p:seq concurrent="1" nextAc="seek">
+              <p:cTn id="2" dur="indefinite" nodeType="mainSeq">
+                <p:childTnLst>
+                  <p:par>
+                    <p:cTn id="3" fill="hold">
+                      <p:stCondLst>
+                        <p:cond delay="indefinite"/>
+                      </p:stCondLst>
+                      <p:childTnLst>
+                        <p:par>
+                          <p:cTn id="4" fill="hold">
+                            <p:stCondLst>
+                              <p:cond delay="0"/>
+                            </p:stCondLst>
+                            <p:childTnLst>
+                              <p:par>
+                                <p:cTn id="5" presetID="10" presetClass="entr" presetSubtype="0" fill="hold" grpId="0" nodeType="clickEffect">
+                                  <p:stCondLst>
+                                    <p:cond delay="0"/>
+                                  </p:stCondLst>
+                                  <p:childTnLst>
+                                    <p:set>
+                                      <p:cBhvr>
+                                        <p:cTn id="6" dur="1" fill="hold">
+                                          <p:stCondLst>
+                                            <p:cond delay="0"/>
+                                          </p:stCondLst>
+                                        </p:cTn>
+                                        <p:tgtEl>
+                                          <p:spTgt spid="3"/>
+                                        </p:tgtEl>
+                                        <p:attrNameLst>
+                                          <p:attrName>style.visibility</p:attrName>
+                                        </p:attrNameLst>
+                                      </p:cBhvr>
+                                      <p:to>
+                                        <p:strVal val="visible"/>
+                                      </p:to>
+                                    </p:set>
+                                    <p:animEffect transition="in" filter="fade">
+                                      <p:cBhvr>
+                                        <p:cTn id="7" dur="500"/>
+                                        <p:tgtEl>
+                                          <p:spTgt spid="3"/>
+                                        </p:tgtEl>
+                                      </p:cBhvr>
+                                    </p:animEffect>
+                                  </p:childTnLst>
+                                </p:cTn>
+                              </p:par>
+                            </p:childTnLst>
+                          </p:cTn>
+                        </p:par>
+                      </p:childTnLst>
+                    </p:cTn>
+                  </p:par>
+                  <p:par>
+                    <p:cTn id="8" fill="hold">
+                      <p:stCondLst>
+                        <p:cond delay="indefinite"/>
+                      </p:stCondLst>
+                      <p:childTnLst>
+                        <p:par>
+                          <p:cTn id="9" fill="hold">
+                            <p:stCondLst>
+                              <p:cond delay="0"/>
+                            </p:stCondLst>
+                            <p:childTnLst>
+                              <p:par>
+                                <p:cTn id="10" presetID="10" presetClass="entr" presetSubtype="0" fill="hold" grpId="0" nodeType="clickEffect">
+                                  <p:stCondLst>
+                                    <p:cond delay="0"/>
+                                  </p:stCondLst>
+                                  <p:childTnLst>
+                                    <p:set>
+                                      <p:cBhvr>
+                                        <p:cTn id="11" dur="1" fill="hold">
+                                          <p:stCondLst>
+                                            <p:cond delay="0"/>
+                                          </p:stCondLst>
+                                        </p:cTn>
+                                        <p:tgtEl>
+                                          <p:spTgt spid="11"/>
+                                        </p:tgtEl>
+                                        <p:attrNameLst>
+                                          <p:attrName>style.visibility</p:attrName>
+                                        </p:attrNameLst>
+                                      </p:cBhvr>
+                                      <p:to>
+                                        <p:strVal val="visible"/>
+                                      </p:to>
+                                    </p:set>
+                                    <p:animEffect transition="in" filter="fade">
+                                      <p:cBhvr>
+                                        <p:cTn id="12" dur="500"/>
+                                        <p:tgtEl>
+                                          <p:spTgt spid="11"/>
+                                        </p:tgtEl>
+                                      </p:cBhvr>
+                                    </p:animEffect>
+                                  </p:childTnLst>
+                                </p:cTn>
+                              </p:par>
+                            </p:childTnLst>
+                          </p:cTn>
+                        </p:par>
+                      </p:childTnLst>
+                    </p:cTn>
+                  </p:par>
+                </p:childTnLst>
+              </p:cTn>
+              <p:prevCondLst>
+                <p:cond evt="onPrev" delay="0">
+                  <p:tgtEl>
+                    <p:sldTgt/>
+                  </p:tgtEl>
+                </p:cond>
+              </p:prevCondLst>
+              <p:nextCondLst>
+                <p:cond evt="onNext" delay="0">
+                  <p:tgtEl>
+                    <p:sldTgt/>
+                  </p:tgtEl>
+                </p:cond>
+              </p:nextCondLst>
+            </p:seq>
+          </p:childTnLst>
+        </p:cTn>
+      </p:par>
+    </p:tnLst>
+    <p:bldLst>
+      <p:bldP spid="3" grpId="0" animBg="1"/>
+      <p:bldP spid="11" grpId="0" animBg="1"/>
+    </p:bldLst>
+  </p:timing>
+</p:sld>
+</file>
+
 <file path=ppt/slides/slide3.xml><?xml version="1.0" encoding="utf-8"?>
 <p:sld xmlns:a="http://schemas.openxmlformats.org/drawingml/2006/main" xmlns:r="http://schemas.openxmlformats.org/officeDocument/2006/relationships" xmlns:p="http://schemas.openxmlformats.org/presentationml/2006/main">
   <p:cSld>

</xml_diff>